<commit_message>
Reference  Architecture - ppt
</commit_message>
<xml_diff>
--- a/docs/deployment_guide/images/cloudwanQS-singleslide.pptx
+++ b/docs/deployment_guide/images/cloudwanQS-singleslide.pptx
@@ -44604,6 +44604,108 @@
           </a:p>
         </p:txBody>
       </p:sp>
+      <p:pic>
+        <p:nvPicPr>
+          <p:cNvPr id="114" name="Graphic 17">
+            <a:extLst>
+              <a:ext uri="{FF2B5EF4-FFF2-40B4-BE49-F238E27FC236}">
+                <a16:creationId xmlns:a16="http://schemas.microsoft.com/office/drawing/2014/main" id="{227B0EC0-B91B-5145-8134-98DD27DDC958}"/>
+              </a:ext>
+            </a:extLst>
+          </p:cNvPr>
+          <p:cNvPicPr>
+            <a:picLocks noChangeAspect="1" noChangeArrowheads="1"/>
+          </p:cNvPicPr>
+          <p:nvPr/>
+        </p:nvPicPr>
+        <p:blipFill>
+          <a:blip r:embed="rId22">
+            <a:extLst>
+              <a:ext uri="{28A0092B-C50C-407E-A947-70E740481C1C}">
+                <a14:useLocalDpi xmlns:a14="http://schemas.microsoft.com/office/drawing/2010/main" val="0"/>
+              </a:ext>
+            </a:extLst>
+          </a:blip>
+          <a:srcRect/>
+          <a:stretch>
+            <a:fillRect/>
+          </a:stretch>
+        </p:blipFill>
+        <p:spPr bwMode="auto">
+          <a:xfrm>
+            <a:off x="8760381" y="1609325"/>
+            <a:ext cx="762000" cy="762000"/>
+          </a:xfrm>
+          <a:prstGeom prst="rect">
+            <a:avLst/>
+          </a:prstGeom>
+          <a:noFill/>
+          <a:ln>
+            <a:noFill/>
+          </a:ln>
+          <a:extLst>
+            <a:ext uri="{909E8E84-426E-40DD-AFC4-6F175D3DCCD1}">
+              <a14:hiddenFill xmlns:a14="http://schemas.microsoft.com/office/drawing/2010/main">
+                <a:solidFill>
+                  <a:srgbClr val="FFFFFF"/>
+                </a:solidFill>
+              </a14:hiddenFill>
+            </a:ext>
+            <a:ext uri="{91240B29-F687-4F45-9708-019B960494DF}">
+              <a14:hiddenLine xmlns:a14="http://schemas.microsoft.com/office/drawing/2010/main" w="9525">
+                <a:solidFill>
+                  <a:srgbClr val="000000"/>
+                </a:solidFill>
+                <a:miter lim="800000"/>
+                <a:headEnd/>
+                <a:tailEnd/>
+              </a14:hiddenLine>
+            </a:ext>
+          </a:extLst>
+        </p:spPr>
+      </p:pic>
+      <p:sp>
+        <p:nvSpPr>
+          <p:cNvPr id="115" name="TextBox 114">
+            <a:extLst>
+              <a:ext uri="{FF2B5EF4-FFF2-40B4-BE49-F238E27FC236}">
+                <a16:creationId xmlns:a16="http://schemas.microsoft.com/office/drawing/2014/main" id="{FC0966D8-B716-104A-98EF-00BEEF352990}"/>
+              </a:ext>
+            </a:extLst>
+          </p:cNvPr>
+          <p:cNvSpPr txBox="1"/>
+          <p:nvPr/>
+        </p:nvSpPr>
+        <p:spPr>
+          <a:xfrm>
+            <a:off x="8370230" y="2429294"/>
+            <a:ext cx="1506552" cy="246221"/>
+          </a:xfrm>
+          <a:prstGeom prst="rect">
+            <a:avLst/>
+          </a:prstGeom>
+          <a:noFill/>
+        </p:spPr>
+        <p:txBody>
+          <a:bodyPr wrap="square" rtlCol="0">
+            <a:spAutoFit/>
+          </a:bodyPr>
+          <a:lstStyle/>
+          <a:p>
+            <a:pPr algn="ctr"/>
+            <a:r>
+              <a:rPr lang="en-US" sz="1000" dirty="0">
+                <a:solidFill>
+                  <a:schemeClr val="tx2"/>
+                </a:solidFill>
+                <a:latin typeface="Arial" panose="020B0604020202020204" pitchFamily="34" charset="0"/>
+                <a:cs typeface="Arial" panose="020B0604020202020204" pitchFamily="34" charset="0"/>
+              </a:rPr>
+              <a:t>Amazon CloudWatch</a:t>
+            </a:r>
+          </a:p>
+        </p:txBody>
+      </p:sp>
     </p:spTree>
     <p:extLst>
       <p:ext uri="{BB962C8B-B14F-4D97-AF65-F5344CB8AC3E}">

</xml_diff>